<commit_message>
Zmiana w slaidzie o open-source
</commit_message>
<xml_diff>
--- a/GitHub - Talk .pptx
+++ b/GitHub - Talk .pptx
@@ -1004,6 +1004,25 @@
           <a:p>
             <a:r>
               <a:rPr lang="en-US" baseline="0" dirty="0" smtClean="0"/>
+              <a:t>		- co to jest </a:t>
+            </a:r>
+            <a:r>
+              <a:rPr lang="en-US" baseline="0" dirty="0" err="1" smtClean="0"/>
+              <a:t>git</a:t>
+            </a:r>
+            <a:r>
+              <a:rPr lang="en-US" baseline="0" dirty="0" smtClean="0"/>
+              <a:t> – 1 </a:t>
+            </a:r>
+            <a:r>
+              <a:rPr lang="en-US" baseline="0" dirty="0" err="1" smtClean="0"/>
+              <a:t>slaid</a:t>
+            </a:r>
+            <a:endParaRPr lang="en-US" baseline="0" dirty="0" smtClean="0"/>
+          </a:p>
+          <a:p>
+            <a:r>
+              <a:rPr lang="en-US" baseline="0" dirty="0" smtClean="0"/>
               <a:t>		- </a:t>
             </a:r>
             <a:r>
@@ -1358,19 +1377,101 @@
           <a:p>
             <a:r>
               <a:rPr lang="en-US" baseline="0" dirty="0" smtClean="0"/>
-              <a:t>	- open-source movement &amp;&amp; open-</a:t>
-            </a:r>
-            <a:r>
-              <a:rPr lang="en-US" baseline="0" dirty="0" err="1" smtClean="0"/>
-              <a:t>api</a:t>
+              <a:t>	- open-source movement </a:t>
+            </a:r>
+          </a:p>
+          <a:p>
+            <a:r>
+              <a:rPr lang="en-US" baseline="0" dirty="0" smtClean="0"/>
+              <a:t>		- </a:t>
+            </a:r>
+            <a:r>
+              <a:rPr lang="en-US" baseline="0" dirty="0" smtClean="0"/>
+              <a:t>w </a:t>
+            </a:r>
+            <a:r>
+              <a:rPr lang="en-US" baseline="0" dirty="0" err="1" smtClean="0"/>
+              <a:t>paru</a:t>
+            </a:r>
+            <a:r>
+              <a:rPr lang="en-US" baseline="0" dirty="0" smtClean="0"/>
+              <a:t> </a:t>
+            </a:r>
+            <a:r>
+              <a:rPr lang="en-US" baseline="0" dirty="0" err="1" smtClean="0"/>
+              <a:t>zdaniach</a:t>
+            </a:r>
+            <a:r>
+              <a:rPr lang="en-US" baseline="0" dirty="0" smtClean="0"/>
+              <a:t> </a:t>
+            </a:r>
+            <a:r>
+              <a:rPr lang="en-US" baseline="0" dirty="0" err="1" smtClean="0"/>
+              <a:t>opisac</a:t>
+            </a:r>
+            <a:r>
+              <a:rPr lang="en-US" baseline="0" dirty="0" smtClean="0"/>
+              <a:t> co to jest </a:t>
+            </a:r>
+            <a:r>
+              <a:rPr lang="en-US" baseline="0" dirty="0" err="1" smtClean="0"/>
+              <a:t>i</a:t>
+            </a:r>
+            <a:r>
+              <a:rPr lang="en-US" baseline="0" dirty="0" smtClean="0"/>
+              <a:t> </a:t>
+            </a:r>
+            <a:r>
+              <a:rPr lang="en-US" baseline="0" dirty="0" err="1" smtClean="0"/>
+              <a:t>ze</a:t>
+            </a:r>
+            <a:r>
+              <a:rPr lang="en-US" baseline="0" dirty="0" smtClean="0"/>
+              <a:t> </a:t>
+            </a:r>
+            <a:r>
+              <a:rPr lang="en-US" baseline="0" dirty="0" err="1" smtClean="0"/>
+              <a:t>git</a:t>
+            </a:r>
+            <a:r>
+              <a:rPr lang="en-US" baseline="0" dirty="0" smtClean="0"/>
+              <a:t> hub ma </a:t>
+            </a:r>
+            <a:r>
+              <a:rPr lang="en-US" baseline="0" dirty="0" err="1" smtClean="0"/>
+              <a:t>tego</a:t>
+            </a:r>
+            <a:r>
+              <a:rPr lang="en-US" baseline="0" dirty="0" smtClean="0"/>
+              <a:t> </a:t>
+            </a:r>
+            <a:r>
+              <a:rPr lang="en-US" baseline="0" dirty="0" err="1" smtClean="0"/>
+              <a:t>całą</a:t>
+            </a:r>
+            <a:r>
+              <a:rPr lang="en-US" baseline="0" dirty="0" smtClean="0"/>
+              <a:t> </a:t>
+            </a:r>
+            <a:r>
+              <a:rPr lang="en-US" baseline="0" dirty="0" err="1" smtClean="0"/>
+              <a:t>masę</a:t>
             </a:r>
             <a:endParaRPr lang="en-US" baseline="0" dirty="0" smtClean="0"/>
           </a:p>
           <a:p>
             <a:r>
-              <a:rPr lang="en-US" baseline="0" dirty="0" smtClean="0"/>
-              <a:t>		- ? ? ?</a:t>
-            </a:r>
+              <a:rPr lang="en-US" baseline="0" smtClean="0"/>
+              <a:t>		- </a:t>
+            </a:r>
+            <a:endParaRPr lang="en-US" baseline="0" dirty="0" smtClean="0"/>
+          </a:p>
+          <a:p>
+            <a:r>
+              <a:rPr lang="en-US" baseline="0" dirty="0" smtClean="0"/>
+              <a:t>		</a:t>
+            </a:r>
+            <a:endParaRPr lang="en-US" baseline="0" dirty="0" smtClean="0"/>
           </a:p>
           <a:p>
             <a:r>
@@ -1443,7 +1544,7 @@
               <a:t> pare </a:t>
             </a:r>
             <a:r>
-              <a:rPr lang="en-US" baseline="0" smtClean="0"/>
+              <a:rPr lang="en-US" baseline="0" dirty="0" err="1" smtClean="0"/>
               <a:t>kluczy</a:t>
             </a:r>
             <a:endParaRPr lang="en-US" baseline="0" dirty="0" smtClean="0"/>
@@ -2708,68 +2809,32 @@
             </a:r>
             <a:r>
               <a:rPr lang="en-US" baseline="0" dirty="0" smtClean="0"/>
-              <a:t>/tech/elements/the-software-that-builds-software</a:t>
-            </a:r>
-          </a:p>
-          <a:p>
-            <a:r>
-              <a:rPr lang="en-US" dirty="0" smtClean="0"/>
-              <a:t>What is </a:t>
-            </a:r>
-            <a:r>
-              <a:rPr lang="en-US" dirty="0" err="1" smtClean="0"/>
-              <a:t>GitHub</a:t>
-            </a:r>
-            <a:r>
-              <a:rPr lang="en-US" baseline="0" dirty="0" smtClean="0"/>
-              <a:t>          - http://</a:t>
-            </a:r>
-            <a:r>
-              <a:rPr lang="en-US" baseline="0" dirty="0" err="1" smtClean="0"/>
-              <a:t>techcrunch.com</a:t>
-            </a:r>
-            <a:r>
-              <a:rPr lang="en-US" baseline="0" dirty="0" smtClean="0"/>
-              <a:t>/2012/07/14/what-exactly-is-</a:t>
-            </a:r>
-            <a:r>
-              <a:rPr lang="en-US" baseline="0" dirty="0" err="1" smtClean="0"/>
-              <a:t>github</a:t>
-            </a:r>
-            <a:r>
-              <a:rPr lang="en-US" baseline="0" dirty="0" smtClean="0"/>
-              <a:t>-anyway/</a:t>
+              <a:t>/tech/elements/the-software-that-builds-</a:t>
+            </a:r>
+            <a:r>
+              <a:rPr lang="en-US" baseline="0" dirty="0" smtClean="0"/>
+              <a:t>software</a:t>
             </a:r>
           </a:p>
           <a:p>
             <a:endParaRPr lang="en-US" baseline="0" dirty="0" smtClean="0"/>
           </a:p>
           <a:p>
-            <a:endParaRPr lang="en-US" baseline="0" dirty="0" smtClean="0"/>
-          </a:p>
-          <a:p>
-            <a:r>
-              <a:rPr lang="en-US" dirty="0" smtClean="0"/>
-              <a:t>https://</a:t>
-            </a:r>
-            <a:r>
-              <a:rPr lang="en-US" dirty="0" err="1" smtClean="0"/>
-              <a:t>www.lullabot.com</a:t>
-            </a:r>
-            <a:r>
-              <a:rPr lang="en-US" dirty="0" smtClean="0"/>
-              <a:t>/articles/managing-projects-with-</a:t>
-            </a:r>
-            <a:r>
-              <a:rPr lang="en-US" dirty="0" err="1" smtClean="0"/>
-              <a:t>github</a:t>
-            </a:r>
-            <a:endParaRPr lang="en-US" dirty="0" smtClean="0"/>
-          </a:p>
-          <a:p>
-            <a:r>
-              <a:rPr lang="en-US" dirty="0" smtClean="0"/>
-              <a:t>http://</a:t>
+            <a:r>
+              <a:rPr lang="en-US" dirty="0" smtClean="0"/>
+              <a:t>VERY GOOD</a:t>
+            </a:r>
+            <a:r>
+              <a:rPr lang="en-US" baseline="0" dirty="0" smtClean="0"/>
+              <a:t> - </a:t>
+            </a:r>
+            <a:r>
+              <a:rPr lang="en-US" dirty="0" smtClean="0"/>
+              <a:t>http</a:t>
+            </a:r>
+            <a:r>
+              <a:rPr lang="en-US" dirty="0" smtClean="0"/>
+              <a:t>://</a:t>
             </a:r>
             <a:r>
               <a:rPr lang="en-US" dirty="0" err="1" smtClean="0"/>
@@ -2791,11 +2856,31 @@
           <a:p>
             <a:r>
               <a:rPr lang="en-US" dirty="0" smtClean="0"/>
+              <a:t>I could use the part</a:t>
+            </a:r>
+            <a:r>
+              <a:rPr lang="en-US" baseline="0" dirty="0" smtClean="0"/>
+              <a:t> about </a:t>
+            </a:r>
+            <a:r>
+              <a:rPr lang="en-US" baseline="0" dirty="0" err="1" smtClean="0"/>
+              <a:t>git</a:t>
+            </a:r>
+            <a:r>
+              <a:rPr lang="en-US" baseline="0" dirty="0" smtClean="0"/>
+              <a:t> - </a:t>
+            </a:r>
+            <a:r>
+              <a:rPr lang="en-US" dirty="0" smtClean="0"/>
               <a:t>Pretty</a:t>
             </a:r>
             <a:r>
               <a:rPr lang="en-US" baseline="0" dirty="0" smtClean="0"/>
-              <a:t> good showcase - http://</a:t>
+              <a:t> </a:t>
+            </a:r>
+            <a:r>
+              <a:rPr lang="en-US" baseline="0" dirty="0" smtClean="0"/>
+              <a:t>good showcase - http://</a:t>
             </a:r>
             <a:r>
               <a:rPr lang="en-US" baseline="0" dirty="0" err="1" smtClean="0"/>
@@ -2841,37 +2926,11 @@
             </a:r>
             <a:r>
               <a:rPr lang="en-US" baseline="0" dirty="0" smtClean="0"/>
-              <a:t>-for-artists</a:t>
-            </a:r>
-          </a:p>
-          <a:p>
-            <a:r>
-              <a:rPr lang="en-US" baseline="0" dirty="0" smtClean="0"/>
-              <a:t>Take the into : http://</a:t>
-            </a:r>
-            <a:r>
-              <a:rPr lang="en-US" baseline="0" dirty="0" err="1" smtClean="0"/>
-              <a:t>www.slideshare.net</a:t>
-            </a:r>
-            <a:r>
-              <a:rPr lang="en-US" baseline="0" dirty="0" smtClean="0"/>
-              <a:t>/halr9000/using-</a:t>
-            </a:r>
-            <a:r>
-              <a:rPr lang="en-US" baseline="0" dirty="0" err="1" smtClean="0"/>
-              <a:t>git</a:t>
-            </a:r>
-            <a:r>
-              <a:rPr lang="en-US" baseline="0" dirty="0" smtClean="0"/>
-              <a:t>-and-</a:t>
-            </a:r>
-            <a:r>
-              <a:rPr lang="en-US" baseline="0" dirty="0" err="1" smtClean="0"/>
-              <a:t>github</a:t>
-            </a:r>
-            <a:r>
-              <a:rPr lang="en-US" baseline="0" dirty="0" smtClean="0"/>
-              <a:t>-for-non-developers</a:t>
+              <a:t>-for-</a:t>
+            </a:r>
+            <a:r>
+              <a:rPr lang="en-US" baseline="0" dirty="0" smtClean="0"/>
+              <a:t>artists</a:t>
             </a:r>
             <a:endParaRPr lang="en-US" dirty="0" smtClean="0"/>
           </a:p>

</xml_diff>

<commit_message>
Nowe przykłady niestandardowych zastosowan
</commit_message>
<xml_diff>
--- a/GitHub - Talk .pptx
+++ b/GitHub - Talk .pptx
@@ -5,25 +5,26 @@
     <p:sldMasterId id="2147483648" r:id="rId1"/>
   </p:sldMasterIdLst>
   <p:notesMasterIdLst>
-    <p:notesMasterId r:id="rId18"/>
+    <p:notesMasterId r:id="rId19"/>
   </p:notesMasterIdLst>
   <p:sldIdLst>
     <p:sldId id="256" r:id="rId2"/>
     <p:sldId id="258" r:id="rId3"/>
-    <p:sldId id="257" r:id="rId4"/>
-    <p:sldId id="271" r:id="rId5"/>
-    <p:sldId id="272" r:id="rId6"/>
-    <p:sldId id="270" r:id="rId7"/>
-    <p:sldId id="259" r:id="rId8"/>
-    <p:sldId id="268" r:id="rId9"/>
-    <p:sldId id="260" r:id="rId10"/>
-    <p:sldId id="265" r:id="rId11"/>
-    <p:sldId id="273" r:id="rId12"/>
-    <p:sldId id="262" r:id="rId13"/>
-    <p:sldId id="266" r:id="rId14"/>
-    <p:sldId id="263" r:id="rId15"/>
-    <p:sldId id="261" r:id="rId16"/>
-    <p:sldId id="264" r:id="rId17"/>
+    <p:sldId id="274" r:id="rId4"/>
+    <p:sldId id="257" r:id="rId5"/>
+    <p:sldId id="271" r:id="rId6"/>
+    <p:sldId id="272" r:id="rId7"/>
+    <p:sldId id="270" r:id="rId8"/>
+    <p:sldId id="259" r:id="rId9"/>
+    <p:sldId id="268" r:id="rId10"/>
+    <p:sldId id="260" r:id="rId11"/>
+    <p:sldId id="265" r:id="rId12"/>
+    <p:sldId id="273" r:id="rId13"/>
+    <p:sldId id="262" r:id="rId14"/>
+    <p:sldId id="266" r:id="rId15"/>
+    <p:sldId id="263" r:id="rId16"/>
+    <p:sldId id="261" r:id="rId17"/>
+    <p:sldId id="264" r:id="rId18"/>
   </p:sldIdLst>
   <p:sldSz cx="9144000" cy="6858000" type="screen4x3"/>
   <p:notesSz cx="6858000" cy="9144000"/>
@@ -521,7 +522,63 @@
           <a:p>
             <a:r>
               <a:rPr lang="en-US" dirty="0" smtClean="0"/>
-              <a:t>The difference between :</a:t>
+              <a:t>Template:</a:t>
+            </a:r>
+            <a:r>
+              <a:rPr lang="en-US" baseline="0" dirty="0" smtClean="0"/>
+              <a:t> https://</a:t>
+            </a:r>
+            <a:r>
+              <a:rPr lang="en-US" baseline="0" dirty="0" err="1" smtClean="0"/>
+              <a:t>speakerdeck.com</a:t>
+            </a:r>
+            <a:r>
+              <a:rPr lang="en-US" baseline="0" dirty="0" smtClean="0"/>
+              <a:t>/</a:t>
+            </a:r>
+            <a:r>
+              <a:rPr lang="en-US" baseline="0" dirty="0" err="1" smtClean="0"/>
+              <a:t>garethr</a:t>
+            </a:r>
+            <a:r>
+              <a:rPr lang="en-US" baseline="0" dirty="0" smtClean="0"/>
+              <a:t>/operations-without-the-operating-system</a:t>
+            </a:r>
+          </a:p>
+          <a:p>
+            <a:r>
+              <a:rPr lang="en-US" baseline="0" dirty="0" smtClean="0"/>
+              <a:t>Template: https://</a:t>
+            </a:r>
+            <a:r>
+              <a:rPr lang="en-US" baseline="0" dirty="0" err="1" smtClean="0"/>
+              <a:t>speakerdeck.com</a:t>
+            </a:r>
+            <a:r>
+              <a:rPr lang="en-US" baseline="0" dirty="0" smtClean="0"/>
+              <a:t>/</a:t>
+            </a:r>
+            <a:r>
+              <a:rPr lang="en-US" baseline="0" dirty="0" err="1" smtClean="0"/>
+              <a:t>portertech</a:t>
+            </a:r>
+            <a:r>
+              <a:rPr lang="en-US" baseline="0" dirty="0" smtClean="0"/>
+              <a:t>/infrastructure-as-code-and-monitoring</a:t>
+            </a:r>
+            <a:endParaRPr lang="en-US" dirty="0" smtClean="0"/>
+          </a:p>
+          <a:p>
+            <a:endParaRPr lang="en-US" dirty="0" smtClean="0"/>
+          </a:p>
+          <a:p>
+            <a:r>
+              <a:rPr lang="en-US" dirty="0" smtClean="0"/>
+              <a:t>The </a:t>
+            </a:r>
+            <a:r>
+              <a:rPr lang="en-US" dirty="0" smtClean="0"/>
+              <a:t>difference between :</a:t>
             </a:r>
           </a:p>
           <a:p>
@@ -2082,7 +2139,7 @@
           <a:p>
             <a:fld id="{4CB756B3-920B-BF4B-941F-609798E27EE1}" type="slidenum">
               <a:rPr lang="en-US" smtClean="0"/>
-              <a:t>11</a:t>
+              <a:t>12</a:t>
             </a:fld>
             <a:endParaRPr lang="en-US"/>
           </a:p>
@@ -2199,8 +2256,72 @@
             </a:r>
             <a:r>
               <a:rPr lang="en-US" dirty="0" smtClean="0"/>
-              <a:t>-coding</a:t>
-            </a:r>
+              <a:t>-</a:t>
+            </a:r>
+            <a:r>
+              <a:rPr lang="en-US" dirty="0" smtClean="0"/>
+              <a:t>coding</a:t>
+            </a:r>
+          </a:p>
+          <a:p>
+            <a:r>
+              <a:rPr lang="en-US" dirty="0" smtClean="0"/>
+              <a:t> - http://</a:t>
+            </a:r>
+            <a:r>
+              <a:rPr lang="en-US" dirty="0" err="1" smtClean="0"/>
+              <a:t>www.itworld.com</a:t>
+            </a:r>
+            <a:r>
+              <a:rPr lang="en-US" dirty="0" smtClean="0"/>
+              <a:t>/article/2822952/open-source-tools/142227-Gitty-up-12-things-other-than-programming-code-that-are-managed-on-GitHub.html?nsdr=true#slide3</a:t>
+            </a:r>
+          </a:p>
+          <a:p>
+            <a:r>
+              <a:rPr lang="en-US" dirty="0" smtClean="0"/>
+              <a:t> - http://</a:t>
+            </a:r>
+            <a:r>
+              <a:rPr lang="en-US" dirty="0" err="1" smtClean="0"/>
+              <a:t>www.infoworld.com</a:t>
+            </a:r>
+            <a:r>
+              <a:rPr lang="en-US" dirty="0" smtClean="0"/>
+              <a:t>/article/2886828/collaboration-software/</a:t>
+            </a:r>
+            <a:r>
+              <a:rPr lang="en-US" dirty="0" err="1" smtClean="0"/>
+              <a:t>github</a:t>
+            </a:r>
+            <a:r>
+              <a:rPr lang="en-US" dirty="0" smtClean="0"/>
+              <a:t>-for-the-rest-of-</a:t>
+            </a:r>
+            <a:r>
+              <a:rPr lang="en-US" dirty="0" err="1" smtClean="0"/>
+              <a:t>us.html</a:t>
+            </a:r>
+            <a:endParaRPr lang="en-US" dirty="0" smtClean="0"/>
+          </a:p>
+          <a:p>
+            <a:r>
+              <a:rPr lang="en-US" dirty="0" smtClean="0"/>
+              <a:t> - http://</a:t>
+            </a:r>
+            <a:r>
+              <a:rPr lang="en-US" dirty="0" err="1" smtClean="0"/>
+              <a:t>www.searchenginepeople.com</a:t>
+            </a:r>
+            <a:r>
+              <a:rPr lang="en-US" dirty="0" smtClean="0"/>
+              <a:t>/blog/managing-non-code-projects-with-</a:t>
+            </a:r>
+            <a:r>
+              <a:rPr lang="en-US" smtClean="0"/>
+              <a:t>github.html</a:t>
+            </a:r>
+            <a:endParaRPr lang="en-US" dirty="0" smtClean="0"/>
           </a:p>
           <a:p>
             <a:endParaRPr lang="en-US" dirty="0" smtClean="0"/>
@@ -2489,7 +2610,7 @@
           <a:p>
             <a:fld id="{4CB756B3-920B-BF4B-941F-609798E27EE1}" type="slidenum">
               <a:rPr lang="en-US" smtClean="0"/>
-              <a:t>12</a:t>
+              <a:t>13</a:t>
             </a:fld>
             <a:endParaRPr lang="en-US"/>
           </a:p>
@@ -2669,7 +2790,7 @@
           <a:p>
             <a:fld id="{4CB756B3-920B-BF4B-941F-609798E27EE1}" type="slidenum">
               <a:rPr lang="en-US" smtClean="0"/>
-              <a:t>13</a:t>
+              <a:t>14</a:t>
             </a:fld>
             <a:endParaRPr lang="en-US"/>
           </a:p>
@@ -2749,170 +2870,6 @@
             <a:endParaRPr lang="en-US" dirty="0" smtClean="0"/>
           </a:p>
           <a:p>
-            <a:r>
-              <a:rPr lang="en-US" sz="1200" kern="1200" dirty="0" err="1" smtClean="0">
-                <a:solidFill>
-                  <a:schemeClr val="tx1"/>
-                </a:solidFill>
-                <a:latin typeface="+mn-lt"/>
-                <a:ea typeface="+mn-ea"/>
-                <a:cs typeface="+mn-cs"/>
-              </a:rPr>
-              <a:t>gry</a:t>
-            </a:r>
-            <a:r>
-              <a:rPr lang="en-US" sz="1200" kern="1200" dirty="0" smtClean="0">
-                <a:solidFill>
-                  <a:schemeClr val="tx1"/>
-                </a:solidFill>
-                <a:latin typeface="+mn-lt"/>
-                <a:ea typeface="+mn-ea"/>
-                <a:cs typeface="+mn-cs"/>
-              </a:rPr>
-              <a:t>:</a:t>
-            </a:r>
-          </a:p>
-          <a:p>
-            <a:r>
-              <a:rPr lang="en-US" sz="1200" u="sng" kern="1200" dirty="0" smtClean="0">
-                <a:solidFill>
-                  <a:schemeClr val="tx1"/>
-                </a:solidFill>
-                <a:latin typeface="+mn-lt"/>
-                <a:ea typeface="+mn-ea"/>
-                <a:cs typeface="+mn-cs"/>
-                <a:hlinkClick r:id="rId3"/>
-              </a:rPr>
-              <a:t>https://github.com/Q42/flippybitandtheattackofthehexadecimalsfrombase16.com</a:t>
-            </a:r>
-          </a:p>
-          <a:p>
-            <a:r>
-              <a:rPr lang="en-US" sz="1200" u="sng" kern="1200" dirty="0" smtClean="0">
-                <a:solidFill>
-                  <a:schemeClr val="tx1"/>
-                </a:solidFill>
-                <a:latin typeface="+mn-lt"/>
-                <a:ea typeface="+mn-ea"/>
-                <a:cs typeface="+mn-cs"/>
-                <a:hlinkClick r:id="rId4"/>
-              </a:rPr>
-              <a:t>https://github.com/Hextris/hextris</a:t>
-            </a:r>
-          </a:p>
-          <a:p>
-            <a:r>
-              <a:rPr lang="en-US" sz="1200" kern="1200" dirty="0" err="1" smtClean="0">
-                <a:solidFill>
-                  <a:schemeClr val="tx1"/>
-                </a:solidFill>
-                <a:latin typeface="+mn-lt"/>
-                <a:ea typeface="+mn-ea"/>
-                <a:cs typeface="+mn-cs"/>
-              </a:rPr>
-              <a:t>prezentacje</a:t>
-            </a:r>
-            <a:r>
-              <a:rPr lang="en-US" sz="1200" kern="1200" dirty="0" smtClean="0">
-                <a:solidFill>
-                  <a:schemeClr val="tx1"/>
-                </a:solidFill>
-                <a:latin typeface="+mn-lt"/>
-                <a:ea typeface="+mn-ea"/>
-                <a:cs typeface="+mn-cs"/>
-              </a:rPr>
-              <a:t>:</a:t>
-            </a:r>
-          </a:p>
-          <a:p>
-            <a:r>
-              <a:rPr lang="en-US" sz="1200" u="sng" kern="1200" dirty="0" smtClean="0">
-                <a:solidFill>
-                  <a:schemeClr val="tx1"/>
-                </a:solidFill>
-                <a:latin typeface="+mn-lt"/>
-                <a:ea typeface="+mn-ea"/>
-                <a:cs typeface="+mn-cs"/>
-                <a:hlinkClick r:id="rId5"/>
-              </a:rPr>
-              <a:t>https://github.com/imakewebthings/deck.js</a:t>
-            </a:r>
-          </a:p>
-          <a:p>
-            <a:r>
-              <a:rPr lang="en-US" sz="1200" u="sng" kern="1200" dirty="0" smtClean="0">
-                <a:solidFill>
-                  <a:schemeClr val="tx1"/>
-                </a:solidFill>
-                <a:latin typeface="+mn-lt"/>
-                <a:ea typeface="+mn-ea"/>
-                <a:cs typeface="+mn-cs"/>
-                <a:hlinkClick r:id="rId6"/>
-              </a:rPr>
-              <a:t>https://github.com/viniciusalmeida/ninja-presentation</a:t>
-            </a:r>
-          </a:p>
-          <a:p>
-            <a:r>
-              <a:rPr lang="en-US" sz="1200" kern="1200" dirty="0" err="1" smtClean="0">
-                <a:solidFill>
-                  <a:schemeClr val="tx1"/>
-                </a:solidFill>
-                <a:latin typeface="+mn-lt"/>
-                <a:ea typeface="+mn-ea"/>
-                <a:cs typeface="+mn-cs"/>
-              </a:rPr>
-              <a:t>mindmapy</a:t>
-            </a:r>
-            <a:r>
-              <a:rPr lang="en-US" sz="1200" kern="1200" dirty="0" smtClean="0">
-                <a:solidFill>
-                  <a:schemeClr val="tx1"/>
-                </a:solidFill>
-                <a:latin typeface="+mn-lt"/>
-                <a:ea typeface="+mn-ea"/>
-                <a:cs typeface="+mn-cs"/>
-              </a:rPr>
-              <a:t>:</a:t>
-            </a:r>
-          </a:p>
-          <a:p>
-            <a:r>
-              <a:rPr lang="en-US" sz="1200" u="sng" kern="1200" dirty="0" smtClean="0">
-                <a:solidFill>
-                  <a:schemeClr val="tx1"/>
-                </a:solidFill>
-                <a:latin typeface="+mn-lt"/>
-                <a:ea typeface="+mn-ea"/>
-                <a:cs typeface="+mn-cs"/>
-                <a:hlinkClick r:id="rId7"/>
-              </a:rPr>
-              <a:t>https://github.com/ondras/my-mind</a:t>
-            </a:r>
-          </a:p>
-          <a:p>
-            <a:r>
-              <a:rPr lang="en-US" sz="1200" u="sng" kern="1200" dirty="0" smtClean="0">
-                <a:solidFill>
-                  <a:schemeClr val="tx1"/>
-                </a:solidFill>
-                <a:latin typeface="+mn-lt"/>
-                <a:ea typeface="+mn-ea"/>
-                <a:cs typeface="+mn-cs"/>
-                <a:hlinkClick r:id="rId8"/>
-              </a:rPr>
-              <a:t>https://github.com/freeplane/freeplane</a:t>
-            </a:r>
-            <a:endParaRPr lang="en-US" sz="1200" u="sng" kern="1200" dirty="0" smtClean="0">
-              <a:solidFill>
-                <a:schemeClr val="tx1"/>
-              </a:solidFill>
-              <a:latin typeface="+mn-lt"/>
-              <a:ea typeface="+mn-ea"/>
-              <a:cs typeface="+mn-cs"/>
-            </a:endParaRPr>
-          </a:p>
-          <a:p>
             <a:endParaRPr lang="en-US" sz="1200" u="sng" kern="1200" dirty="0" smtClean="0">
               <a:solidFill>
                 <a:schemeClr val="tx1"/>
@@ -2999,7 +2956,7 @@
           <a:p>
             <a:fld id="{4CB756B3-920B-BF4B-941F-609798E27EE1}" type="slidenum">
               <a:rPr lang="en-US" smtClean="0"/>
-              <a:t>14</a:t>
+              <a:t>15</a:t>
             </a:fld>
             <a:endParaRPr lang="en-US"/>
           </a:p>
@@ -3215,7 +3172,7 @@
           <a:p>
             <a:fld id="{4CB756B3-920B-BF4B-941F-609798E27EE1}" type="slidenum">
               <a:rPr lang="en-US" smtClean="0"/>
-              <a:t>16</a:t>
+              <a:t>17</a:t>
             </a:fld>
             <a:endParaRPr lang="en-US"/>
           </a:p>
@@ -3455,7 +3412,7 @@
           <a:p>
             <a:fld id="{4CB756B3-920B-BF4B-941F-609798E27EE1}" type="slidenum">
               <a:rPr lang="en-US" smtClean="0"/>
-              <a:t>3</a:t>
+              <a:t>4</a:t>
             </a:fld>
             <a:endParaRPr lang="en-US"/>
           </a:p>
@@ -4029,7 +3986,7 @@
           <a:p>
             <a:fld id="{4CB756B3-920B-BF4B-941F-609798E27EE1}" type="slidenum">
               <a:rPr lang="en-US" smtClean="0"/>
-              <a:t>4</a:t>
+              <a:t>5</a:t>
             </a:fld>
             <a:endParaRPr lang="en-US"/>
           </a:p>
@@ -4699,7 +4656,7 @@
           <a:p>
             <a:fld id="{4CB756B3-920B-BF4B-941F-609798E27EE1}" type="slidenum">
               <a:rPr lang="en-US" smtClean="0"/>
-              <a:t>5</a:t>
+              <a:t>6</a:t>
             </a:fld>
             <a:endParaRPr lang="en-US"/>
           </a:p>
@@ -4912,7 +4869,7 @@
           <a:p>
             <a:fld id="{4CB756B3-920B-BF4B-941F-609798E27EE1}" type="slidenum">
               <a:rPr lang="en-US" smtClean="0"/>
-              <a:t>6</a:t>
+              <a:t>7</a:t>
             </a:fld>
             <a:endParaRPr lang="en-US"/>
           </a:p>
@@ -5249,7 +5206,7 @@
           <a:p>
             <a:fld id="{4CB756B3-920B-BF4B-941F-609798E27EE1}" type="slidenum">
               <a:rPr lang="en-US" smtClean="0"/>
-              <a:t>7</a:t>
+              <a:t>8</a:t>
             </a:fld>
             <a:endParaRPr lang="en-US"/>
           </a:p>
@@ -5396,7 +5353,7 @@
           <a:p>
             <a:fld id="{4CB756B3-920B-BF4B-941F-609798E27EE1}" type="slidenum">
               <a:rPr lang="en-US" smtClean="0"/>
-              <a:t>8</a:t>
+              <a:t>9</a:t>
             </a:fld>
             <a:endParaRPr lang="en-US"/>
           </a:p>
@@ -5769,7 +5726,7 @@
           <a:p>
             <a:fld id="{4CB756B3-920B-BF4B-941F-609798E27EE1}" type="slidenum">
               <a:rPr lang="en-US" smtClean="0"/>
-              <a:t>9</a:t>
+              <a:t>10</a:t>
             </a:fld>
             <a:endParaRPr lang="en-US"/>
           </a:p>
@@ -6030,7 +5987,7 @@
           <a:p>
             <a:fld id="{4CB756B3-920B-BF4B-941F-609798E27EE1}" type="slidenum">
               <a:rPr lang="en-US" smtClean="0"/>
-              <a:t>10</a:t>
+              <a:t>11</a:t>
             </a:fld>
             <a:endParaRPr lang="en-US"/>
           </a:p>
@@ -9152,16 +9109,8 @@
           <a:lstStyle/>
           <a:p>
             <a:r>
-              <a:rPr lang="en-US" dirty="0" err="1" smtClean="0"/>
-              <a:t>Praca</a:t>
-            </a:r>
-            <a:r>
-              <a:rPr lang="en-US" dirty="0" smtClean="0"/>
-              <a:t> w </a:t>
-            </a:r>
-            <a:r>
-              <a:rPr lang="en-US" dirty="0" err="1" smtClean="0"/>
-              <a:t>zespole</a:t>
+              <a:rPr lang="en-US" dirty="0" smtClean="0"/>
+              <a:t>How do I use it - Demo</a:t>
             </a:r>
             <a:endParaRPr lang="en-US" dirty="0"/>
           </a:p>
@@ -9183,23 +9132,40 @@
           <a:lstStyle/>
           <a:p>
             <a:r>
+              <a:rPr lang="en-US" dirty="0" smtClean="0"/>
+              <a:t>How do I register</a:t>
+            </a:r>
+          </a:p>
+          <a:p>
+            <a:r>
+              <a:rPr lang="en-US" dirty="0" smtClean="0"/>
+              <a:t>How to do I install </a:t>
+            </a:r>
+            <a:r>
               <a:rPr lang="en-US" dirty="0" err="1" smtClean="0"/>
-              <a:t>Praca</a:t>
-            </a:r>
-            <a:r>
-              <a:rPr lang="en-US" dirty="0" smtClean="0"/>
-              <a:t> w </a:t>
-            </a:r>
-            <a:r>
-              <a:rPr lang="en-US" dirty="0" err="1" smtClean="0"/>
-              <a:t>grupie</a:t>
-            </a:r>
-            <a:r>
-              <a:rPr lang="en-US" dirty="0" smtClean="0"/>
-              <a:t> </a:t>
-            </a:r>
-          </a:p>
-          <a:p>
+              <a:t>dev</a:t>
+            </a:r>
+            <a:r>
+              <a:rPr lang="en-US" dirty="0" smtClean="0"/>
+              <a:t> tools</a:t>
+            </a:r>
+          </a:p>
+          <a:p>
+            <a:r>
+              <a:rPr lang="en-US" dirty="0" smtClean="0"/>
+              <a:t>How do I create a repo</a:t>
+            </a:r>
+          </a:p>
+          <a:p>
+            <a:r>
+              <a:rPr lang="en-US" dirty="0" smtClean="0"/>
+              <a:t>How do I make/push changes</a:t>
+            </a:r>
+          </a:p>
+          <a:p>
+            <a:pPr marL="0" indent="0">
+              <a:buNone/>
+            </a:pPr>
             <a:endParaRPr lang="en-US" dirty="0"/>
           </a:p>
         </p:txBody>
@@ -9207,13 +9173,20 @@
     </p:spTree>
     <p:extLst>
       <p:ext uri="{BB962C8B-B14F-4D97-AF65-F5344CB8AC3E}">
-        <p14:creationId xmlns:p14="http://schemas.microsoft.com/office/powerpoint/2010/main" val="2460532247"/>
+        <p14:creationId xmlns:p14="http://schemas.microsoft.com/office/powerpoint/2010/main" val="1641265687"/>
       </p:ext>
     </p:extLst>
   </p:cSld>
   <p:clrMapOvr>
     <a:masterClrMapping/>
   </p:clrMapOvr>
+  <p:timing>
+    <p:tnLst>
+      <p:par>
+        <p:cTn xmlns:p14="http://schemas.microsoft.com/office/powerpoint/2010/main" id="1" dur="indefinite" restart="never" nodeType="tmRoot"/>
+      </p:par>
+    </p:tnLst>
+  </p:timing>
 </p:sld>
 </file>
 
@@ -9246,78 +9219,66 @@
         </p:nvSpPr>
         <p:spPr/>
         <p:txBody>
-          <a:bodyPr>
-            <a:normAutofit/>
-          </a:bodyPr>
-          <a:lstStyle/>
-          <a:p>
-            <a:r>
-              <a:rPr lang="en-US" dirty="0"/>
-              <a:t>co </a:t>
-            </a:r>
-            <a:r>
-              <a:rPr lang="en-US" dirty="0" err="1"/>
-              <a:t>github</a:t>
-            </a:r>
-            <a:r>
-              <a:rPr lang="en-US" dirty="0"/>
-              <a:t> </a:t>
-            </a:r>
-            <a:r>
-              <a:rPr lang="en-US" dirty="0" err="1"/>
-              <a:t>moze</a:t>
-            </a:r>
-            <a:r>
-              <a:rPr lang="en-US" dirty="0"/>
-              <a:t> </a:t>
-            </a:r>
-            <a:r>
-              <a:rPr lang="en-US" dirty="0" err="1"/>
-              <a:t>znacycz</a:t>
-            </a:r>
-            <a:r>
-              <a:rPr lang="en-US" dirty="0"/>
-              <a:t> </a:t>
-            </a:r>
-            <a:r>
-              <a:rPr lang="en-US" dirty="0" err="1"/>
-              <a:t>dla</a:t>
-            </a:r>
-            <a:r>
-              <a:rPr lang="en-US" dirty="0"/>
-              <a:t> </a:t>
-            </a:r>
-            <a:r>
-              <a:rPr lang="en-US" dirty="0" smtClean="0"/>
-              <a:t>was</a:t>
-            </a:r>
-            <a:endParaRPr lang="en-US" dirty="0"/>
-          </a:p>
-        </p:txBody>
-      </p:sp>
-      <p:sp>
-        <p:nvSpPr>
-          <p:cNvPr id="3" name="Content Placeholder 2"/>
-          <p:cNvSpPr>
-            <a:spLocks noGrp="1"/>
-          </p:cNvSpPr>
-          <p:nvPr>
-            <p:ph idx="1"/>
-          </p:nvPr>
-        </p:nvSpPr>
-        <p:spPr/>
-        <p:txBody>
           <a:bodyPr/>
           <a:lstStyle/>
           <a:p>
-            <a:endParaRPr lang="en-US"/>
+            <a:r>
+              <a:rPr lang="en-US" dirty="0" err="1" smtClean="0"/>
+              <a:t>Praca</a:t>
+            </a:r>
+            <a:r>
+              <a:rPr lang="en-US" dirty="0" smtClean="0"/>
+              <a:t> w </a:t>
+            </a:r>
+            <a:r>
+              <a:rPr lang="en-US" dirty="0" err="1" smtClean="0"/>
+              <a:t>zespole</a:t>
+            </a:r>
+            <a:endParaRPr lang="en-US" dirty="0"/>
+          </a:p>
+        </p:txBody>
+      </p:sp>
+      <p:sp>
+        <p:nvSpPr>
+          <p:cNvPr id="3" name="Content Placeholder 2"/>
+          <p:cNvSpPr>
+            <a:spLocks noGrp="1"/>
+          </p:cNvSpPr>
+          <p:nvPr>
+            <p:ph idx="1"/>
+          </p:nvPr>
+        </p:nvSpPr>
+        <p:spPr/>
+        <p:txBody>
+          <a:bodyPr/>
+          <a:lstStyle/>
+          <a:p>
+            <a:r>
+              <a:rPr lang="en-US" dirty="0" err="1" smtClean="0"/>
+              <a:t>Praca</a:t>
+            </a:r>
+            <a:r>
+              <a:rPr lang="en-US" dirty="0" smtClean="0"/>
+              <a:t> w </a:t>
+            </a:r>
+            <a:r>
+              <a:rPr lang="en-US" dirty="0" err="1" smtClean="0"/>
+              <a:t>grupie</a:t>
+            </a:r>
+            <a:r>
+              <a:rPr lang="en-US" dirty="0" smtClean="0"/>
+              <a:t> </a:t>
+            </a:r>
+          </a:p>
+          <a:p>
+            <a:endParaRPr lang="en-US" dirty="0"/>
           </a:p>
         </p:txBody>
       </p:sp>
     </p:spTree>
     <p:extLst>
       <p:ext uri="{BB962C8B-B14F-4D97-AF65-F5344CB8AC3E}">
-        <p14:creationId xmlns:p14="http://schemas.microsoft.com/office/powerpoint/2010/main" val="435682818"/>
+        <p14:creationId xmlns:p14="http://schemas.microsoft.com/office/powerpoint/2010/main" val="2460532247"/>
       </p:ext>
     </p:extLst>
   </p:cSld>
@@ -9356,106 +9317,78 @@
         </p:nvSpPr>
         <p:spPr/>
         <p:txBody>
-          <a:bodyPr/>
-          <a:lstStyle/>
-          <a:p>
-            <a:r>
-              <a:rPr lang="en-US" dirty="0" smtClean="0"/>
-              <a:t>Non-</a:t>
-            </a:r>
-            <a:r>
-              <a:rPr lang="en-US" dirty="0" err="1" smtClean="0"/>
-              <a:t>dev</a:t>
-            </a:r>
-            <a:r>
-              <a:rPr lang="en-US" dirty="0" smtClean="0"/>
-              <a:t> uses</a:t>
-            </a:r>
-            <a:endParaRPr lang="en-US" dirty="0"/>
-          </a:p>
-        </p:txBody>
-      </p:sp>
-      <p:sp>
-        <p:nvSpPr>
-          <p:cNvPr id="3" name="Content Placeholder 2"/>
-          <p:cNvSpPr>
-            <a:spLocks noGrp="1"/>
-          </p:cNvSpPr>
-          <p:nvPr>
-            <p:ph idx="1"/>
-          </p:nvPr>
-        </p:nvSpPr>
-        <p:spPr/>
-        <p:txBody>
           <a:bodyPr>
             <a:normAutofit/>
           </a:bodyPr>
           <a:lstStyle/>
           <a:p>
             <a:r>
-              <a:rPr lang="en-US" sz="1600" dirty="0" err="1" smtClean="0"/>
-              <a:t>Classtoom</a:t>
-            </a:r>
-            <a:r>
-              <a:rPr lang="en-US" sz="1600" dirty="0" smtClean="0"/>
-              <a:t> </a:t>
-            </a:r>
-            <a:r>
-              <a:rPr lang="en-US" sz="1600" dirty="0" err="1" smtClean="0"/>
-              <a:t>assignement</a:t>
-            </a:r>
-            <a:r>
-              <a:rPr lang="en-US" sz="1600" dirty="0" smtClean="0"/>
-              <a:t> on </a:t>
-            </a:r>
-            <a:r>
-              <a:rPr lang="en-US" sz="1600" dirty="0" err="1" smtClean="0"/>
-              <a:t>Github</a:t>
-            </a:r>
-            <a:r>
-              <a:rPr lang="en-US" sz="1600" dirty="0" smtClean="0"/>
-              <a:t> </a:t>
-            </a:r>
-            <a:r>
-              <a:rPr lang="en-US" sz="1600" dirty="0" smtClean="0">
-                <a:hlinkClick r:id="rId3"/>
-              </a:rPr>
-              <a:t>–</a:t>
-            </a:r>
-            <a:r>
-              <a:rPr lang="en-US" sz="1600" dirty="0" smtClean="0"/>
-              <a:t> same as Google </a:t>
-            </a:r>
-            <a:r>
-              <a:rPr lang="en-US" sz="1600" dirty="0" err="1" smtClean="0"/>
-              <a:t>Docs</a:t>
-            </a:r>
-            <a:r>
-              <a:rPr lang="en-US" sz="1600" dirty="0" err="1" smtClean="0">
-                <a:hlinkClick r:id="rId3"/>
-              </a:rPr>
-              <a:t>https</a:t>
-            </a:r>
-            <a:r>
-              <a:rPr lang="en-US" sz="1600" dirty="0" smtClean="0">
-                <a:hlinkClick r:id="rId3"/>
-              </a:rPr>
-              <a:t>://github.com/blog/2055-teachers-manage-your-courses-with-classroom-for-github</a:t>
-            </a:r>
-            <a:endParaRPr lang="en-US" sz="1600" dirty="0" smtClean="0"/>
-          </a:p>
-          <a:p>
-            <a:endParaRPr lang="en-US" sz="1600" dirty="0" smtClean="0"/>
-          </a:p>
-          <a:p>
-            <a:endParaRPr lang="en-US" sz="1600" dirty="0"/>
+              <a:rPr lang="en-US" dirty="0"/>
+              <a:t>co </a:t>
+            </a:r>
+            <a:r>
+              <a:rPr lang="en-US" dirty="0" err="1"/>
+              <a:t>github</a:t>
+            </a:r>
+            <a:r>
+              <a:rPr lang="en-US" dirty="0"/>
+              <a:t> </a:t>
+            </a:r>
+            <a:r>
+              <a:rPr lang="en-US" dirty="0" err="1"/>
+              <a:t>moze</a:t>
+            </a:r>
+            <a:r>
+              <a:rPr lang="en-US" dirty="0"/>
+              <a:t> </a:t>
+            </a:r>
+            <a:r>
+              <a:rPr lang="en-US" dirty="0" err="1"/>
+              <a:t>znacycz</a:t>
+            </a:r>
+            <a:r>
+              <a:rPr lang="en-US" dirty="0"/>
+              <a:t> </a:t>
+            </a:r>
+            <a:r>
+              <a:rPr lang="en-US" dirty="0" err="1"/>
+              <a:t>dla</a:t>
+            </a:r>
+            <a:r>
+              <a:rPr lang="en-US" dirty="0"/>
+              <a:t> </a:t>
+            </a:r>
+            <a:r>
+              <a:rPr lang="en-US" dirty="0" smtClean="0"/>
+              <a:t>was</a:t>
+            </a:r>
+            <a:endParaRPr lang="en-US" dirty="0"/>
+          </a:p>
+        </p:txBody>
+      </p:sp>
+      <p:sp>
+        <p:nvSpPr>
+          <p:cNvPr id="3" name="Content Placeholder 2"/>
+          <p:cNvSpPr>
+            <a:spLocks noGrp="1"/>
+          </p:cNvSpPr>
+          <p:nvPr>
+            <p:ph idx="1"/>
+          </p:nvPr>
+        </p:nvSpPr>
+        <p:spPr/>
+        <p:txBody>
+          <a:bodyPr/>
+          <a:lstStyle/>
+          <a:p>
+            <a:endParaRPr lang="en-US"/>
           </a:p>
         </p:txBody>
       </p:sp>
     </p:spTree>
     <p:extLst>
       <p:ext uri="{BB962C8B-B14F-4D97-AF65-F5344CB8AC3E}">
-        <p14:creationId xmlns:p14="http://schemas.microsoft.com/office/powerpoint/2010/main" val="4079327172"/>
+        <p14:creationId xmlns:p14="http://schemas.microsoft.com/office/powerpoint/2010/main" val="435682818"/>
       </p:ext>
     </p:extLst>
   </p:cSld>
@@ -9498,12 +9431,16 @@
           <a:lstStyle/>
           <a:p>
             <a:r>
+              <a:rPr lang="en-US" dirty="0" smtClean="0"/>
+              <a:t>Non-</a:t>
+            </a:r>
+            <a:r>
               <a:rPr lang="en-US" dirty="0" err="1" smtClean="0"/>
-              <a:t>GitHub</a:t>
-            </a:r>
-            <a:r>
-              <a:rPr lang="en-US" dirty="0" smtClean="0"/>
-              <a:t> is your new resume </a:t>
+              <a:t>dev</a:t>
+            </a:r>
+            <a:r>
+              <a:rPr lang="en-US" dirty="0" smtClean="0"/>
+              <a:t> uses</a:t>
             </a:r>
             <a:endParaRPr lang="en-US" dirty="0"/>
           </a:p>
@@ -9522,108 +9459,74 @@
         <p:spPr/>
         <p:txBody>
           <a:bodyPr>
-            <a:normAutofit lnSpcReduction="10000"/>
+            <a:normAutofit/>
           </a:bodyPr>
           <a:lstStyle/>
           <a:p>
             <a:r>
-              <a:rPr lang="en-US" sz="2400" dirty="0" smtClean="0">
+              <a:rPr lang="en-US" sz="1600" dirty="0" err="1" smtClean="0"/>
+              <a:t>Classtoom</a:t>
+            </a:r>
+            <a:r>
+              <a:rPr lang="en-US" sz="1600" dirty="0" smtClean="0"/>
+              <a:t> </a:t>
+            </a:r>
+            <a:r>
+              <a:rPr lang="en-US" sz="1600" dirty="0" err="1" smtClean="0"/>
+              <a:t>assignement</a:t>
+            </a:r>
+            <a:r>
+              <a:rPr lang="en-US" sz="1600" dirty="0" smtClean="0"/>
+              <a:t> on </a:t>
+            </a:r>
+            <a:r>
+              <a:rPr lang="en-US" sz="1600" dirty="0" err="1" smtClean="0"/>
+              <a:t>Github</a:t>
+            </a:r>
+            <a:r>
+              <a:rPr lang="en-US" sz="1600" dirty="0" smtClean="0"/>
+              <a:t> </a:t>
+            </a:r>
+            <a:r>
+              <a:rPr lang="en-US" sz="1600" dirty="0" smtClean="0">
                 <a:hlinkClick r:id="rId3"/>
               </a:rPr>
-              <a:t>http://code.dblock.org/2011/07/14/github-is-your-new-resume.html</a:t>
-            </a:r>
-            <a:endParaRPr lang="en-US" sz="2400" dirty="0" smtClean="0"/>
-          </a:p>
-          <a:p>
-            <a:r>
-              <a:rPr lang="en-US" sz="2400" dirty="0" smtClean="0"/>
-              <a:t>More &amp; more jobs are requiring a </a:t>
-            </a:r>
-            <a:r>
-              <a:rPr lang="en-US" sz="2400" dirty="0" err="1" smtClean="0"/>
-              <a:t>github</a:t>
-            </a:r>
-            <a:r>
-              <a:rPr lang="en-US" sz="2400" dirty="0" smtClean="0"/>
-              <a:t> account followed by references</a:t>
-            </a:r>
-          </a:p>
-          <a:p>
-            <a:r>
-              <a:rPr lang="en-US" sz="2400" dirty="0" smtClean="0"/>
-              <a:t>Make your </a:t>
-            </a:r>
-            <a:r>
-              <a:rPr lang="en-US" sz="2400" dirty="0" err="1" smtClean="0"/>
-              <a:t>GitHub</a:t>
-            </a:r>
-            <a:r>
-              <a:rPr lang="en-US" sz="2400" dirty="0" smtClean="0"/>
-              <a:t> pages your portfolio</a:t>
-            </a:r>
-          </a:p>
-          <a:p>
-            <a:pPr lvl="1"/>
-            <a:r>
-              <a:rPr lang="en-US" sz="2000" dirty="0" smtClean="0"/>
-              <a:t>Even when in school – post you project &amp; </a:t>
-            </a:r>
-            <a:r>
-              <a:rPr lang="en-US" sz="2000" dirty="0" err="1" smtClean="0"/>
-              <a:t>achivements</a:t>
-            </a:r>
-            <a:endParaRPr lang="en-US" sz="2000" dirty="0" smtClean="0"/>
-          </a:p>
-          <a:p>
-            <a:pPr lvl="1"/>
-            <a:r>
-              <a:rPr lang="en-US" sz="2000" dirty="0" smtClean="0"/>
-              <a:t>Learn to work collaboratively with SCM in a team (essential skill for an adult to have in the industry)</a:t>
-            </a:r>
-          </a:p>
-          <a:p>
-            <a:r>
-              <a:rPr lang="en-US" sz="2400" dirty="0" smtClean="0"/>
-              <a:t>Times are shifting</a:t>
-            </a:r>
-          </a:p>
-          <a:p>
-            <a:pPr lvl="1"/>
-            <a:r>
-              <a:rPr lang="en-US" sz="2000" dirty="0" smtClean="0"/>
-              <a:t>One case use </a:t>
-            </a:r>
-            <a:r>
-              <a:rPr lang="en-US" sz="2000" dirty="0" err="1" smtClean="0"/>
-              <a:t>GitHub</a:t>
-            </a:r>
-            <a:r>
-              <a:rPr lang="en-US" sz="2000" dirty="0" smtClean="0"/>
-              <a:t> to confirm if one is really passionate about IT</a:t>
-            </a:r>
-          </a:p>
-          <a:p>
-            <a:r>
-              <a:rPr lang="en-US" sz="2400" dirty="0" smtClean="0"/>
-              <a:t>Your new portfolio </a:t>
-            </a:r>
-            <a:r>
-              <a:rPr lang="en-US" sz="2400" dirty="0" smtClean="0">
-                <a:hlinkClick r:id="rId4"/>
+              <a:t>–</a:t>
+            </a:r>
+            <a:r>
+              <a:rPr lang="en-US" sz="1600" dirty="0" smtClean="0"/>
+              <a:t> same as Google </a:t>
+            </a:r>
+            <a:r>
+              <a:rPr lang="en-US" sz="1600" dirty="0" err="1" smtClean="0"/>
+              <a:t>Docs</a:t>
+            </a:r>
+            <a:r>
+              <a:rPr lang="en-US" sz="1600" dirty="0" err="1" smtClean="0">
+                <a:hlinkClick r:id="rId3"/>
               </a:rPr>
-              <a:t>https://dannguyen.github.io/github-for-portfolios/</a:t>
-            </a:r>
-            <a:endParaRPr lang="en-US" sz="2400" dirty="0" smtClean="0"/>
-          </a:p>
-          <a:p>
-            <a:endParaRPr lang="en-US" sz="2400" dirty="0" smtClean="0"/>
+              <a:t>https</a:t>
+            </a:r>
+            <a:r>
+              <a:rPr lang="en-US" sz="1600" dirty="0" smtClean="0">
+                <a:hlinkClick r:id="rId3"/>
+              </a:rPr>
+              <a:t>://github.com/blog/2055-teachers-manage-your-courses-with-classroom-for-github</a:t>
+            </a:r>
+            <a:endParaRPr lang="en-US" sz="1600" dirty="0" smtClean="0"/>
+          </a:p>
+          <a:p>
+            <a:endParaRPr lang="en-US" sz="1600" dirty="0" smtClean="0"/>
+          </a:p>
+          <a:p>
+            <a:endParaRPr lang="en-US" sz="1600" dirty="0"/>
           </a:p>
         </p:txBody>
       </p:sp>
     </p:spTree>
     <p:extLst>
       <p:ext uri="{BB962C8B-B14F-4D97-AF65-F5344CB8AC3E}">
-        <p14:creationId xmlns:p14="http://schemas.microsoft.com/office/powerpoint/2010/main" val="2830862941"/>
+        <p14:creationId xmlns:p14="http://schemas.microsoft.com/office/powerpoint/2010/main" val="4079327172"/>
       </p:ext>
     </p:extLst>
   </p:cSld>
@@ -9667,15 +9570,11 @@
           <a:p>
             <a:r>
               <a:rPr lang="en-US" dirty="0" err="1" smtClean="0"/>
-              <a:t>Wartościowe</a:t>
-            </a:r>
-            <a:r>
-              <a:rPr lang="en-US" dirty="0" smtClean="0"/>
-              <a:t> </a:t>
-            </a:r>
-            <a:r>
-              <a:rPr lang="en-US" dirty="0" err="1" smtClean="0"/>
-              <a:t>rzeczy</a:t>
+              <a:t>GitHub</a:t>
+            </a:r>
+            <a:r>
+              <a:rPr lang="en-US" dirty="0" smtClean="0"/>
+              <a:t> is your new resume </a:t>
             </a:r>
             <a:endParaRPr lang="en-US" dirty="0"/>
           </a:p>
@@ -9693,21 +9592,109 @@
         </p:nvSpPr>
         <p:spPr/>
         <p:txBody>
-          <a:bodyPr/>
+          <a:bodyPr>
+            <a:normAutofit lnSpcReduction="10000"/>
+          </a:bodyPr>
           <a:lstStyle/>
           <a:p>
             <a:r>
-              <a:rPr lang="en-US" dirty="0" smtClean="0"/>
-              <a:t>Open source</a:t>
-            </a:r>
-            <a:endParaRPr lang="en-US" dirty="0"/>
+              <a:rPr lang="en-US" sz="2400" dirty="0" smtClean="0">
+                <a:hlinkClick r:id="rId3"/>
+              </a:rPr>
+              <a:t>http://code.dblock.org/2011/07/14/github-is-your-new-resume.html</a:t>
+            </a:r>
+            <a:endParaRPr lang="en-US" sz="2400" dirty="0" smtClean="0"/>
+          </a:p>
+          <a:p>
+            <a:r>
+              <a:rPr lang="en-US" sz="2400" dirty="0" smtClean="0"/>
+              <a:t>More &amp; more jobs are requiring a </a:t>
+            </a:r>
+            <a:r>
+              <a:rPr lang="en-US" sz="2400" dirty="0" err="1" smtClean="0"/>
+              <a:t>github</a:t>
+            </a:r>
+            <a:r>
+              <a:rPr lang="en-US" sz="2400" dirty="0" smtClean="0"/>
+              <a:t> account followed by references</a:t>
+            </a:r>
+          </a:p>
+          <a:p>
+            <a:r>
+              <a:rPr lang="en-US" sz="2400" dirty="0" smtClean="0"/>
+              <a:t>Make your </a:t>
+            </a:r>
+            <a:r>
+              <a:rPr lang="en-US" sz="2400" dirty="0" err="1" smtClean="0"/>
+              <a:t>GitHub</a:t>
+            </a:r>
+            <a:r>
+              <a:rPr lang="en-US" sz="2400" dirty="0" smtClean="0"/>
+              <a:t> pages your portfolio</a:t>
+            </a:r>
+          </a:p>
+          <a:p>
+            <a:pPr lvl="1"/>
+            <a:r>
+              <a:rPr lang="en-US" sz="2000" dirty="0" smtClean="0"/>
+              <a:t>Even when in school – post you project &amp; </a:t>
+            </a:r>
+            <a:r>
+              <a:rPr lang="en-US" sz="2000" dirty="0" err="1" smtClean="0"/>
+              <a:t>achivements</a:t>
+            </a:r>
+            <a:endParaRPr lang="en-US" sz="2000" dirty="0" smtClean="0"/>
+          </a:p>
+          <a:p>
+            <a:pPr lvl="1"/>
+            <a:r>
+              <a:rPr lang="en-US" sz="2000" dirty="0" smtClean="0"/>
+              <a:t>Learn to work collaboratively with SCM in a team (essential skill for an adult to have in the industry)</a:t>
+            </a:r>
+          </a:p>
+          <a:p>
+            <a:r>
+              <a:rPr lang="en-US" sz="2400" dirty="0" smtClean="0"/>
+              <a:t>Times are shifting</a:t>
+            </a:r>
+          </a:p>
+          <a:p>
+            <a:pPr lvl="1"/>
+            <a:r>
+              <a:rPr lang="en-US" sz="2000" dirty="0" smtClean="0"/>
+              <a:t>One case use </a:t>
+            </a:r>
+            <a:r>
+              <a:rPr lang="en-US" sz="2000" dirty="0" err="1" smtClean="0"/>
+              <a:t>GitHub</a:t>
+            </a:r>
+            <a:r>
+              <a:rPr lang="en-US" sz="2000" dirty="0" smtClean="0"/>
+              <a:t> to confirm if one is really passionate about IT</a:t>
+            </a:r>
+          </a:p>
+          <a:p>
+            <a:r>
+              <a:rPr lang="en-US" sz="2400" dirty="0" smtClean="0"/>
+              <a:t>Your new portfolio </a:t>
+            </a:r>
+            <a:r>
+              <a:rPr lang="en-US" sz="2400" dirty="0" smtClean="0">
+                <a:hlinkClick r:id="rId4"/>
+              </a:rPr>
+              <a:t>https://dannguyen.github.io/github-for-portfolios/</a:t>
+            </a:r>
+            <a:endParaRPr lang="en-US" sz="2400" dirty="0" smtClean="0"/>
+          </a:p>
+          <a:p>
+            <a:endParaRPr lang="en-US" sz="2400" dirty="0" smtClean="0"/>
           </a:p>
         </p:txBody>
       </p:sp>
     </p:spTree>
     <p:extLst>
       <p:ext uri="{BB962C8B-B14F-4D97-AF65-F5344CB8AC3E}">
-        <p14:creationId xmlns:p14="http://schemas.microsoft.com/office/powerpoint/2010/main" val="3160308828"/>
+        <p14:creationId xmlns:p14="http://schemas.microsoft.com/office/powerpoint/2010/main" val="2830862941"/>
       </p:ext>
     </p:extLst>
   </p:cSld>
@@ -9750,6 +9737,183 @@
           <a:lstStyle/>
           <a:p>
             <a:r>
+              <a:rPr lang="en-US" dirty="0" err="1" smtClean="0"/>
+              <a:t>Wartościowe</a:t>
+            </a:r>
+            <a:r>
+              <a:rPr lang="en-US" dirty="0" smtClean="0"/>
+              <a:t> </a:t>
+            </a:r>
+            <a:r>
+              <a:rPr lang="en-US" dirty="0" err="1" smtClean="0"/>
+              <a:t>rzeczy</a:t>
+            </a:r>
+            <a:endParaRPr lang="en-US" dirty="0"/>
+          </a:p>
+        </p:txBody>
+      </p:sp>
+      <p:sp>
+        <p:nvSpPr>
+          <p:cNvPr id="3" name="Content Placeholder 2"/>
+          <p:cNvSpPr>
+            <a:spLocks noGrp="1"/>
+          </p:cNvSpPr>
+          <p:nvPr>
+            <p:ph idx="1"/>
+          </p:nvPr>
+        </p:nvSpPr>
+        <p:spPr/>
+        <p:txBody>
+          <a:bodyPr>
+            <a:normAutofit fontScale="85000" lnSpcReduction="20000"/>
+          </a:bodyPr>
+          <a:lstStyle/>
+          <a:p>
+            <a:r>
+              <a:rPr lang="en-US" dirty="0" smtClean="0"/>
+              <a:t>Open </a:t>
+            </a:r>
+            <a:r>
+              <a:rPr lang="en-US" dirty="0" smtClean="0"/>
+              <a:t>source</a:t>
+            </a:r>
+          </a:p>
+          <a:p>
+            <a:r>
+              <a:rPr lang="en-US" dirty="0" err="1"/>
+              <a:t>gry</a:t>
+            </a:r>
+            <a:r>
+              <a:rPr lang="en-US" dirty="0"/>
+              <a:t>:</a:t>
+            </a:r>
+          </a:p>
+          <a:p>
+            <a:pPr lvl="1"/>
+            <a:r>
+              <a:rPr lang="en-US" u="sng" dirty="0">
+                <a:hlinkClick r:id="rId3"/>
+              </a:rPr>
+              <a:t>https://github.com/Q42/flippybitandtheattackofthehexadecimalsfrombase16.com</a:t>
+            </a:r>
+          </a:p>
+          <a:p>
+            <a:pPr lvl="1"/>
+            <a:r>
+              <a:rPr lang="en-US" u="sng" dirty="0">
+                <a:hlinkClick r:id="rId4"/>
+              </a:rPr>
+              <a:t>https://github.com/Hextris/hextris</a:t>
+            </a:r>
+          </a:p>
+          <a:p>
+            <a:r>
+              <a:rPr lang="en-US" dirty="0" err="1"/>
+              <a:t>prezentacje</a:t>
+            </a:r>
+            <a:r>
+              <a:rPr lang="en-US" dirty="0"/>
+              <a:t>:</a:t>
+            </a:r>
+          </a:p>
+          <a:p>
+            <a:pPr lvl="1"/>
+            <a:r>
+              <a:rPr lang="en-US" u="sng" dirty="0">
+                <a:hlinkClick r:id="rId5"/>
+              </a:rPr>
+              <a:t>https://github.com/imakewebthings/deck.js</a:t>
+            </a:r>
+          </a:p>
+          <a:p>
+            <a:pPr lvl="1"/>
+            <a:r>
+              <a:rPr lang="en-US" u="sng" dirty="0">
+                <a:hlinkClick r:id="rId6"/>
+              </a:rPr>
+              <a:t>https://github.com/viniciusalmeida/ninja-presentation</a:t>
+            </a:r>
+          </a:p>
+          <a:p>
+            <a:r>
+              <a:rPr lang="en-US" dirty="0" err="1"/>
+              <a:t>mindmapy</a:t>
+            </a:r>
+            <a:r>
+              <a:rPr lang="en-US" dirty="0"/>
+              <a:t>:</a:t>
+            </a:r>
+          </a:p>
+          <a:p>
+            <a:pPr lvl="1"/>
+            <a:r>
+              <a:rPr lang="en-US" u="sng" dirty="0">
+                <a:hlinkClick r:id="rId7"/>
+              </a:rPr>
+              <a:t>https://github.com/ondras/my-mind</a:t>
+            </a:r>
+          </a:p>
+          <a:p>
+            <a:pPr lvl="1"/>
+            <a:r>
+              <a:rPr lang="en-US" u="sng" dirty="0">
+                <a:hlinkClick r:id="rId8"/>
+              </a:rPr>
+              <a:t>https://github.com/freeplane/freeplane</a:t>
+            </a:r>
+            <a:endParaRPr lang="en-US" u="sng" dirty="0"/>
+          </a:p>
+          <a:p>
+            <a:endParaRPr lang="en-US" dirty="0"/>
+          </a:p>
+        </p:txBody>
+      </p:sp>
+    </p:spTree>
+    <p:extLst>
+      <p:ext uri="{BB962C8B-B14F-4D97-AF65-F5344CB8AC3E}">
+        <p14:creationId xmlns:p14="http://schemas.microsoft.com/office/powerpoint/2010/main" val="3160308828"/>
+      </p:ext>
+    </p:extLst>
+  </p:cSld>
+  <p:clrMapOvr>
+    <a:masterClrMapping/>
+  </p:clrMapOvr>
+</p:sld>
+</file>
+
+<file path=ppt/slides/slide16.xml><?xml version="1.0" encoding="utf-8"?>
+<p:sld xmlns:a="http://schemas.openxmlformats.org/drawingml/2006/main" xmlns:r="http://schemas.openxmlformats.org/officeDocument/2006/relationships" xmlns:p="http://schemas.openxmlformats.org/presentationml/2006/main">
+  <p:cSld>
+    <p:spTree>
+      <p:nvGrpSpPr>
+        <p:cNvPr id="1" name=""/>
+        <p:cNvGrpSpPr/>
+        <p:nvPr/>
+      </p:nvGrpSpPr>
+      <p:grpSpPr>
+        <a:xfrm>
+          <a:off x="0" y="0"/>
+          <a:ext cx="0" cy="0"/>
+          <a:chOff x="0" y="0"/>
+          <a:chExt cx="0" cy="0"/>
+        </a:xfrm>
+      </p:grpSpPr>
+      <p:sp>
+        <p:nvSpPr>
+          <p:cNvPr id="2" name="Title 1"/>
+          <p:cNvSpPr>
+            <a:spLocks noGrp="1"/>
+          </p:cNvSpPr>
+          <p:nvPr>
+            <p:ph type="title"/>
+          </p:nvPr>
+        </p:nvSpPr>
+        <p:spPr/>
+        <p:txBody>
+          <a:bodyPr/>
+          <a:lstStyle/>
+          <a:p>
+            <a:r>
               <a:rPr lang="en-US" dirty="0" smtClean="0"/>
               <a:t>Cool stuff about </a:t>
             </a:r>
@@ -9796,6 +9960,9 @@
               <a:rPr lang="en-US" dirty="0" err="1" smtClean="0"/>
               <a:t>etc</a:t>
             </a:r>
+            <a:endParaRPr lang="en-US" dirty="0" smtClean="0"/>
+          </a:p>
+          <a:p>
             <a:endParaRPr lang="en-US" dirty="0"/>
           </a:p>
         </p:txBody>
@@ -9813,7 +9980,7 @@
 </p:sld>
 </file>
 
-<file path=ppt/slides/slide16.xml><?xml version="1.0" encoding="utf-8"?>
+<file path=ppt/slides/slide17.xml><?xml version="1.0" encoding="utf-8"?>
 <p:sld xmlns:a="http://schemas.openxmlformats.org/drawingml/2006/main" xmlns:r="http://schemas.openxmlformats.org/officeDocument/2006/relationships" xmlns:p="http://schemas.openxmlformats.org/presentationml/2006/main">
   <p:cSld>
     <p:spTree>
@@ -10173,6 +10340,78 @@
           <a:p>
             <a:r>
               <a:rPr lang="en-US" dirty="0" smtClean="0"/>
+              <a:t>Who am I</a:t>
+            </a:r>
+            <a:endParaRPr lang="en-US" dirty="0"/>
+          </a:p>
+        </p:txBody>
+      </p:sp>
+      <p:sp>
+        <p:nvSpPr>
+          <p:cNvPr id="3" name="Content Placeholder 2"/>
+          <p:cNvSpPr>
+            <a:spLocks noGrp="1"/>
+          </p:cNvSpPr>
+          <p:nvPr>
+            <p:ph idx="1"/>
+          </p:nvPr>
+        </p:nvSpPr>
+        <p:spPr/>
+        <p:txBody>
+          <a:bodyPr/>
+          <a:lstStyle/>
+          <a:p>
+            <a:endParaRPr lang="en-US"/>
+          </a:p>
+        </p:txBody>
+      </p:sp>
+    </p:spTree>
+    <p:extLst>
+      <p:ext uri="{BB962C8B-B14F-4D97-AF65-F5344CB8AC3E}">
+        <p14:creationId xmlns:p14="http://schemas.microsoft.com/office/powerpoint/2010/main" val="1623420420"/>
+      </p:ext>
+    </p:extLst>
+  </p:cSld>
+  <p:clrMapOvr>
+    <a:masterClrMapping/>
+  </p:clrMapOvr>
+</p:sld>
+</file>
+
+<file path=ppt/slides/slide4.xml><?xml version="1.0" encoding="utf-8"?>
+<p:sld xmlns:a="http://schemas.openxmlformats.org/drawingml/2006/main" xmlns:r="http://schemas.openxmlformats.org/officeDocument/2006/relationships" xmlns:p="http://schemas.openxmlformats.org/presentationml/2006/main">
+  <p:cSld>
+    <p:spTree>
+      <p:nvGrpSpPr>
+        <p:cNvPr id="1" name=""/>
+        <p:cNvGrpSpPr/>
+        <p:nvPr/>
+      </p:nvGrpSpPr>
+      <p:grpSpPr>
+        <a:xfrm>
+          <a:off x="0" y="0"/>
+          <a:ext cx="0" cy="0"/>
+          <a:chOff x="0" y="0"/>
+          <a:chExt cx="0" cy="0"/>
+        </a:xfrm>
+      </p:grpSpPr>
+      <p:sp>
+        <p:nvSpPr>
+          <p:cNvPr id="2" name="Title 1"/>
+          <p:cNvSpPr>
+            <a:spLocks noGrp="1"/>
+          </p:cNvSpPr>
+          <p:nvPr>
+            <p:ph type="title"/>
+          </p:nvPr>
+        </p:nvSpPr>
+        <p:spPr/>
+        <p:txBody>
+          <a:bodyPr/>
+          <a:lstStyle/>
+          <a:p>
+            <a:r>
+              <a:rPr lang="en-US" dirty="0" smtClean="0"/>
               <a:t>Agenda</a:t>
             </a:r>
             <a:endParaRPr lang="en-US" dirty="0"/>
@@ -10315,78 +10554,6 @@
 </p:sld>
 </file>
 
-<file path=ppt/slides/slide4.xml><?xml version="1.0" encoding="utf-8"?>
-<p:sld xmlns:a="http://schemas.openxmlformats.org/drawingml/2006/main" xmlns:r="http://schemas.openxmlformats.org/officeDocument/2006/relationships" xmlns:p="http://schemas.openxmlformats.org/presentationml/2006/main">
-  <p:cSld>
-    <p:spTree>
-      <p:nvGrpSpPr>
-        <p:cNvPr id="1" name=""/>
-        <p:cNvGrpSpPr/>
-        <p:nvPr/>
-      </p:nvGrpSpPr>
-      <p:grpSpPr>
-        <a:xfrm>
-          <a:off x="0" y="0"/>
-          <a:ext cx="0" cy="0"/>
-          <a:chOff x="0" y="0"/>
-          <a:chExt cx="0" cy="0"/>
-        </a:xfrm>
-      </p:grpSpPr>
-      <p:sp>
-        <p:nvSpPr>
-          <p:cNvPr id="2" name="Title 1"/>
-          <p:cNvSpPr>
-            <a:spLocks noGrp="1"/>
-          </p:cNvSpPr>
-          <p:nvPr>
-            <p:ph type="title"/>
-          </p:nvPr>
-        </p:nvSpPr>
-        <p:spPr/>
-        <p:txBody>
-          <a:bodyPr/>
-          <a:lstStyle/>
-          <a:p>
-            <a:r>
-              <a:rPr lang="en-US" dirty="0" smtClean="0"/>
-              <a:t>Intro</a:t>
-            </a:r>
-            <a:endParaRPr lang="en-US" dirty="0"/>
-          </a:p>
-        </p:txBody>
-      </p:sp>
-      <p:sp>
-        <p:nvSpPr>
-          <p:cNvPr id="3" name="Content Placeholder 2"/>
-          <p:cNvSpPr>
-            <a:spLocks noGrp="1"/>
-          </p:cNvSpPr>
-          <p:nvPr>
-            <p:ph idx="1"/>
-          </p:nvPr>
-        </p:nvSpPr>
-        <p:spPr/>
-        <p:txBody>
-          <a:bodyPr/>
-          <a:lstStyle/>
-          <a:p>
-            <a:endParaRPr lang="en-US"/>
-          </a:p>
-        </p:txBody>
-      </p:sp>
-    </p:spTree>
-    <p:extLst>
-      <p:ext uri="{BB962C8B-B14F-4D97-AF65-F5344CB8AC3E}">
-        <p14:creationId xmlns:p14="http://schemas.microsoft.com/office/powerpoint/2010/main" val="2977619377"/>
-      </p:ext>
-    </p:extLst>
-  </p:cSld>
-  <p:clrMapOvr>
-    <a:masterClrMapping/>
-  </p:clrMapOvr>
-</p:sld>
-</file>
-
 <file path=ppt/slides/slide5.xml><?xml version="1.0" encoding="utf-8"?>
 <p:sld xmlns:a="http://schemas.openxmlformats.org/drawingml/2006/main" xmlns:r="http://schemas.openxmlformats.org/officeDocument/2006/relationships" xmlns:p="http://schemas.openxmlformats.org/presentationml/2006/main">
   <p:cSld>
@@ -10416,99 +10583,40 @@
         </p:nvSpPr>
         <p:spPr/>
         <p:txBody>
-          <a:bodyPr>
-            <a:normAutofit/>
-          </a:bodyPr>
-          <a:lstStyle/>
-          <a:p>
-            <a:r>
-              <a:rPr lang="en-US" dirty="0"/>
-              <a:t>co </a:t>
-            </a:r>
-            <a:r>
-              <a:rPr lang="en-US" dirty="0" err="1"/>
-              <a:t>github</a:t>
-            </a:r>
-            <a:r>
-              <a:rPr lang="en-US" dirty="0"/>
-              <a:t> </a:t>
-            </a:r>
-            <a:r>
-              <a:rPr lang="en-US" dirty="0" err="1"/>
-              <a:t>znaczy</a:t>
-            </a:r>
-            <a:r>
-              <a:rPr lang="en-US" dirty="0"/>
-              <a:t> </a:t>
-            </a:r>
-            <a:r>
-              <a:rPr lang="en-US" dirty="0" err="1"/>
-              <a:t>dla</a:t>
-            </a:r>
-            <a:r>
-              <a:rPr lang="en-US" dirty="0"/>
-              <a:t> </a:t>
-            </a:r>
-            <a:r>
-              <a:rPr lang="en-US" dirty="0" err="1" smtClean="0"/>
-              <a:t>mnie</a:t>
-            </a:r>
-            <a:endParaRPr lang="en-US" dirty="0"/>
-          </a:p>
-        </p:txBody>
-      </p:sp>
-      <p:sp>
-        <p:nvSpPr>
-          <p:cNvPr id="3" name="Content Placeholder 2"/>
-          <p:cNvSpPr>
-            <a:spLocks noGrp="1"/>
-          </p:cNvSpPr>
-          <p:nvPr>
-            <p:ph idx="1"/>
-          </p:nvPr>
-        </p:nvSpPr>
-        <p:spPr/>
-        <p:txBody>
           <a:bodyPr/>
           <a:lstStyle/>
           <a:p>
             <a:r>
               <a:rPr lang="en-US" dirty="0" smtClean="0"/>
-              <a:t>Troche </a:t>
-            </a:r>
-            <a:r>
-              <a:rPr lang="en-US" dirty="0" err="1" smtClean="0"/>
-              <a:t>historii</a:t>
-            </a:r>
-            <a:r>
-              <a:rPr lang="en-US" dirty="0" smtClean="0"/>
-              <a:t>?</a:t>
-            </a:r>
-          </a:p>
-          <a:p>
-            <a:r>
-              <a:rPr lang="en-US" dirty="0" err="1" smtClean="0"/>
-              <a:t>Git&amp;Hub</a:t>
-            </a:r>
-            <a:r>
-              <a:rPr lang="en-US" dirty="0" smtClean="0"/>
-              <a:t> in </a:t>
-            </a:r>
-            <a:r>
-              <a:rPr lang="en-US" dirty="0" err="1" smtClean="0"/>
-              <a:t>GitHUb</a:t>
-            </a:r>
-            <a:endParaRPr lang="en-US" dirty="0" smtClean="0"/>
-          </a:p>
-          <a:p>
+              <a:t>Intro</a:t>
+            </a:r>
             <a:endParaRPr lang="en-US" dirty="0"/>
+          </a:p>
+        </p:txBody>
+      </p:sp>
+      <p:sp>
+        <p:nvSpPr>
+          <p:cNvPr id="3" name="Content Placeholder 2"/>
+          <p:cNvSpPr>
+            <a:spLocks noGrp="1"/>
+          </p:cNvSpPr>
+          <p:nvPr>
+            <p:ph idx="1"/>
+          </p:nvPr>
+        </p:nvSpPr>
+        <p:spPr/>
+        <p:txBody>
+          <a:bodyPr/>
+          <a:lstStyle/>
+          <a:p>
+            <a:endParaRPr lang="en-US"/>
           </a:p>
         </p:txBody>
       </p:sp>
     </p:spTree>
     <p:extLst>
       <p:ext uri="{BB962C8B-B14F-4D97-AF65-F5344CB8AC3E}">
-        <p14:creationId xmlns:p14="http://schemas.microsoft.com/office/powerpoint/2010/main" val="2505003235"/>
+        <p14:creationId xmlns:p14="http://schemas.microsoft.com/office/powerpoint/2010/main" val="2977619377"/>
       </p:ext>
     </p:extLst>
   </p:cSld>
@@ -10547,56 +10655,91 @@
         </p:nvSpPr>
         <p:spPr/>
         <p:txBody>
+          <a:bodyPr>
+            <a:normAutofit/>
+          </a:bodyPr>
+          <a:lstStyle/>
+          <a:p>
+            <a:r>
+              <a:rPr lang="en-US" dirty="0"/>
+              <a:t>co </a:t>
+            </a:r>
+            <a:r>
+              <a:rPr lang="en-US" dirty="0" err="1"/>
+              <a:t>github</a:t>
+            </a:r>
+            <a:r>
+              <a:rPr lang="en-US" dirty="0"/>
+              <a:t> </a:t>
+            </a:r>
+            <a:r>
+              <a:rPr lang="en-US" dirty="0" err="1"/>
+              <a:t>znaczy</a:t>
+            </a:r>
+            <a:r>
+              <a:rPr lang="en-US" dirty="0"/>
+              <a:t> </a:t>
+            </a:r>
+            <a:r>
+              <a:rPr lang="en-US" dirty="0" err="1"/>
+              <a:t>dla</a:t>
+            </a:r>
+            <a:r>
+              <a:rPr lang="en-US" dirty="0"/>
+              <a:t> </a:t>
+            </a:r>
+            <a:r>
+              <a:rPr lang="en-US" dirty="0" err="1" smtClean="0"/>
+              <a:t>mnie</a:t>
+            </a:r>
+            <a:endParaRPr lang="en-US" dirty="0"/>
+          </a:p>
+        </p:txBody>
+      </p:sp>
+      <p:sp>
+        <p:nvSpPr>
+          <p:cNvPr id="3" name="Content Placeholder 2"/>
+          <p:cNvSpPr>
+            <a:spLocks noGrp="1"/>
+          </p:cNvSpPr>
+          <p:nvPr>
+            <p:ph idx="1"/>
+          </p:nvPr>
+        </p:nvSpPr>
+        <p:spPr/>
+        <p:txBody>
           <a:bodyPr/>
           <a:lstStyle/>
           <a:p>
             <a:r>
               <a:rPr lang="en-US" dirty="0" smtClean="0"/>
-              <a:t>Where did it all start</a:t>
-            </a:r>
-            <a:endParaRPr lang="en-US" dirty="0"/>
-          </a:p>
-        </p:txBody>
-      </p:sp>
-      <p:sp>
-        <p:nvSpPr>
-          <p:cNvPr id="3" name="Content Placeholder 2"/>
-          <p:cNvSpPr>
-            <a:spLocks noGrp="1"/>
-          </p:cNvSpPr>
-          <p:nvPr>
-            <p:ph idx="1"/>
-          </p:nvPr>
-        </p:nvSpPr>
-        <p:spPr/>
-        <p:txBody>
-          <a:bodyPr/>
-          <a:lstStyle/>
-          <a:p>
-            <a:r>
-              <a:rPr lang="en-US" dirty="0" smtClean="0"/>
-              <a:t>Linus -&gt; </a:t>
+              <a:t>Troche </a:t>
             </a:r>
             <a:r>
               <a:rPr lang="en-US" dirty="0" err="1" smtClean="0"/>
-              <a:t>linux</a:t>
-            </a:r>
-            <a:r>
-              <a:rPr lang="en-US" dirty="0" smtClean="0"/>
-              <a:t> -&gt; </a:t>
-            </a:r>
+              <a:t>historii</a:t>
+            </a:r>
+            <a:r>
+              <a:rPr lang="en-US" dirty="0" smtClean="0"/>
+              <a:t>?</a:t>
+            </a:r>
+          </a:p>
+          <a:p>
             <a:r>
               <a:rPr lang="en-US" dirty="0" err="1" smtClean="0"/>
-              <a:t>git</a:t>
-            </a:r>
-            <a:r>
-              <a:rPr lang="en-US" dirty="0" smtClean="0"/>
-              <a:t> -&gt; </a:t>
+              <a:t>Git&amp;Hub</a:t>
+            </a:r>
+            <a:r>
+              <a:rPr lang="en-US" dirty="0" smtClean="0"/>
+              <a:t> in </a:t>
             </a:r>
             <a:r>
               <a:rPr lang="en-US" dirty="0" err="1" smtClean="0"/>
-              <a:t>gitHub</a:t>
-            </a:r>
+              <a:t>GitHUb</a:t>
+            </a:r>
+            <a:endParaRPr lang="en-US" dirty="0" smtClean="0"/>
+          </a:p>
+          <a:p>
             <a:endParaRPr lang="en-US" dirty="0"/>
           </a:p>
         </p:txBody>
@@ -10604,7 +10747,7 @@
     </p:spTree>
     <p:extLst>
       <p:ext uri="{BB962C8B-B14F-4D97-AF65-F5344CB8AC3E}">
-        <p14:creationId xmlns:p14="http://schemas.microsoft.com/office/powerpoint/2010/main" val="1677861988"/>
+        <p14:creationId xmlns:p14="http://schemas.microsoft.com/office/powerpoint/2010/main" val="2505003235"/>
       </p:ext>
     </p:extLst>
   </p:cSld>
@@ -10648,6 +10791,102 @@
           <a:p>
             <a:r>
               <a:rPr lang="en-US" dirty="0" smtClean="0"/>
+              <a:t>Where did it all start</a:t>
+            </a:r>
+            <a:endParaRPr lang="en-US" dirty="0"/>
+          </a:p>
+        </p:txBody>
+      </p:sp>
+      <p:sp>
+        <p:nvSpPr>
+          <p:cNvPr id="3" name="Content Placeholder 2"/>
+          <p:cNvSpPr>
+            <a:spLocks noGrp="1"/>
+          </p:cNvSpPr>
+          <p:nvPr>
+            <p:ph idx="1"/>
+          </p:nvPr>
+        </p:nvSpPr>
+        <p:spPr/>
+        <p:txBody>
+          <a:bodyPr/>
+          <a:lstStyle/>
+          <a:p>
+            <a:r>
+              <a:rPr lang="en-US" dirty="0" smtClean="0"/>
+              <a:t>Linus -&gt; </a:t>
+            </a:r>
+            <a:r>
+              <a:rPr lang="en-US" dirty="0" err="1" smtClean="0"/>
+              <a:t>linux</a:t>
+            </a:r>
+            <a:r>
+              <a:rPr lang="en-US" dirty="0" smtClean="0"/>
+              <a:t> -&gt; </a:t>
+            </a:r>
+            <a:r>
+              <a:rPr lang="en-US" dirty="0" err="1" smtClean="0"/>
+              <a:t>git</a:t>
+            </a:r>
+            <a:r>
+              <a:rPr lang="en-US" dirty="0" smtClean="0"/>
+              <a:t> -&gt; </a:t>
+            </a:r>
+            <a:r>
+              <a:rPr lang="en-US" dirty="0" err="1" smtClean="0"/>
+              <a:t>gitHub</a:t>
+            </a:r>
+            <a:endParaRPr lang="en-US" dirty="0"/>
+          </a:p>
+        </p:txBody>
+      </p:sp>
+    </p:spTree>
+    <p:extLst>
+      <p:ext uri="{BB962C8B-B14F-4D97-AF65-F5344CB8AC3E}">
+        <p14:creationId xmlns:p14="http://schemas.microsoft.com/office/powerpoint/2010/main" val="1677861988"/>
+      </p:ext>
+    </p:extLst>
+  </p:cSld>
+  <p:clrMapOvr>
+    <a:masterClrMapping/>
+  </p:clrMapOvr>
+</p:sld>
+</file>
+
+<file path=ppt/slides/slide8.xml><?xml version="1.0" encoding="utf-8"?>
+<p:sld xmlns:a="http://schemas.openxmlformats.org/drawingml/2006/main" xmlns:r="http://schemas.openxmlformats.org/officeDocument/2006/relationships" xmlns:p="http://schemas.openxmlformats.org/presentationml/2006/main">
+  <p:cSld>
+    <p:spTree>
+      <p:nvGrpSpPr>
+        <p:cNvPr id="1" name=""/>
+        <p:cNvGrpSpPr/>
+        <p:nvPr/>
+      </p:nvGrpSpPr>
+      <p:grpSpPr>
+        <a:xfrm>
+          <a:off x="0" y="0"/>
+          <a:ext cx="0" cy="0"/>
+          <a:chOff x="0" y="0"/>
+          <a:chExt cx="0" cy="0"/>
+        </a:xfrm>
+      </p:grpSpPr>
+      <p:sp>
+        <p:nvSpPr>
+          <p:cNvPr id="2" name="Title 1"/>
+          <p:cNvSpPr>
+            <a:spLocks noGrp="1"/>
+          </p:cNvSpPr>
+          <p:nvPr>
+            <p:ph type="title"/>
+          </p:nvPr>
+        </p:nvSpPr>
+        <p:spPr/>
+        <p:txBody>
+          <a:bodyPr/>
+          <a:lstStyle/>
+          <a:p>
+            <a:r>
+              <a:rPr lang="en-US" dirty="0" smtClean="0"/>
               <a:t>The “</a:t>
             </a:r>
             <a:r>
@@ -10743,82 +10982,6 @@
 </p:sld>
 </file>
 
-<file path=ppt/slides/slide8.xml><?xml version="1.0" encoding="utf-8"?>
-<p:sld xmlns:a="http://schemas.openxmlformats.org/drawingml/2006/main" xmlns:r="http://schemas.openxmlformats.org/officeDocument/2006/relationships" xmlns:p="http://schemas.openxmlformats.org/presentationml/2006/main">
-  <p:cSld>
-    <p:spTree>
-      <p:nvGrpSpPr>
-        <p:cNvPr id="1" name=""/>
-        <p:cNvGrpSpPr/>
-        <p:nvPr/>
-      </p:nvGrpSpPr>
-      <p:grpSpPr>
-        <a:xfrm>
-          <a:off x="0" y="0"/>
-          <a:ext cx="0" cy="0"/>
-          <a:chOff x="0" y="0"/>
-          <a:chExt cx="0" cy="0"/>
-        </a:xfrm>
-      </p:grpSpPr>
-      <p:sp>
-        <p:nvSpPr>
-          <p:cNvPr id="2" name="Title 1"/>
-          <p:cNvSpPr>
-            <a:spLocks noGrp="1"/>
-          </p:cNvSpPr>
-          <p:nvPr>
-            <p:ph type="title"/>
-          </p:nvPr>
-        </p:nvSpPr>
-        <p:spPr/>
-        <p:txBody>
-          <a:bodyPr/>
-          <a:lstStyle/>
-          <a:p>
-            <a:r>
-              <a:rPr lang="en-US" dirty="0"/>
-              <a:t>The “Hub” in </a:t>
-            </a:r>
-            <a:r>
-              <a:rPr lang="en-US" dirty="0" err="1"/>
-              <a:t>GitHub</a:t>
-            </a:r>
-            <a:endParaRPr lang="en-US" dirty="0"/>
-          </a:p>
-        </p:txBody>
-      </p:sp>
-      <p:sp>
-        <p:nvSpPr>
-          <p:cNvPr id="3" name="Content Placeholder 2"/>
-          <p:cNvSpPr>
-            <a:spLocks noGrp="1"/>
-          </p:cNvSpPr>
-          <p:nvPr>
-            <p:ph idx="1"/>
-          </p:nvPr>
-        </p:nvSpPr>
-        <p:spPr/>
-        <p:txBody>
-          <a:bodyPr/>
-          <a:lstStyle/>
-          <a:p>
-            <a:endParaRPr lang="en-US"/>
-          </a:p>
-        </p:txBody>
-      </p:sp>
-    </p:spTree>
-    <p:extLst>
-      <p:ext uri="{BB962C8B-B14F-4D97-AF65-F5344CB8AC3E}">
-        <p14:creationId xmlns:p14="http://schemas.microsoft.com/office/powerpoint/2010/main" val="2574186132"/>
-      </p:ext>
-    </p:extLst>
-  </p:cSld>
-  <p:clrMapOvr>
-    <a:masterClrMapping/>
-  </p:clrMapOvr>
-</p:sld>
-</file>
-
 <file path=ppt/slides/slide9.xml><?xml version="1.0" encoding="utf-8"?>
 <p:sld xmlns:a="http://schemas.openxmlformats.org/drawingml/2006/main" xmlns:r="http://schemas.openxmlformats.org/officeDocument/2006/relationships" xmlns:p="http://schemas.openxmlformats.org/presentationml/2006/main">
   <p:cSld>
@@ -10852,8 +11015,12 @@
           <a:lstStyle/>
           <a:p>
             <a:r>
-              <a:rPr lang="en-US" dirty="0" smtClean="0"/>
-              <a:t>How do I use it - Demo</a:t>
+              <a:rPr lang="en-US" dirty="0"/>
+              <a:t>The “Hub” in </a:t>
+            </a:r>
+            <a:r>
+              <a:rPr lang="en-US" dirty="0" err="1"/>
+              <a:t>GitHub</a:t>
             </a:r>
             <a:endParaRPr lang="en-US" dirty="0"/>
           </a:p>
@@ -10874,62 +11041,20 @@
           <a:bodyPr/>
           <a:lstStyle/>
           <a:p>
-            <a:r>
-              <a:rPr lang="en-US" dirty="0" smtClean="0"/>
-              <a:t>How do I register</a:t>
-            </a:r>
-          </a:p>
-          <a:p>
-            <a:r>
-              <a:rPr lang="en-US" dirty="0" smtClean="0"/>
-              <a:t>How to do I install </a:t>
-            </a:r>
-            <a:r>
-              <a:rPr lang="en-US" dirty="0" err="1" smtClean="0"/>
-              <a:t>dev</a:t>
-            </a:r>
-            <a:r>
-              <a:rPr lang="en-US" dirty="0" smtClean="0"/>
-              <a:t> tools</a:t>
-            </a:r>
-          </a:p>
-          <a:p>
-            <a:r>
-              <a:rPr lang="en-US" dirty="0" smtClean="0"/>
-              <a:t>How do I create a repo</a:t>
-            </a:r>
-          </a:p>
-          <a:p>
-            <a:r>
-              <a:rPr lang="en-US" dirty="0" smtClean="0"/>
-              <a:t>How do I make/push changes</a:t>
-            </a:r>
-          </a:p>
-          <a:p>
-            <a:pPr marL="0" indent="0">
-              <a:buNone/>
-            </a:pPr>
-            <a:endParaRPr lang="en-US" dirty="0"/>
+            <a:endParaRPr lang="en-US"/>
           </a:p>
         </p:txBody>
       </p:sp>
     </p:spTree>
     <p:extLst>
       <p:ext uri="{BB962C8B-B14F-4D97-AF65-F5344CB8AC3E}">
-        <p14:creationId xmlns:p14="http://schemas.microsoft.com/office/powerpoint/2010/main" val="1641265687"/>
+        <p14:creationId xmlns:p14="http://schemas.microsoft.com/office/powerpoint/2010/main" val="2574186132"/>
       </p:ext>
     </p:extLst>
   </p:cSld>
   <p:clrMapOvr>
     <a:masterClrMapping/>
   </p:clrMapOvr>
-  <p:timing>
-    <p:tnLst>
-      <p:par>
-        <p:cTn xmlns:p14="http://schemas.microsoft.com/office/powerpoint/2010/main" id="1" dur="indefinite" restart="never" nodeType="tmRoot"/>
-      </p:par>
-    </p:tnLst>
-  </p:timing>
 </p:sld>
 </file>
 

</xml_diff>

<commit_message>
Dodanie wynalazków NASA w codziennym życiu
</commit_message>
<xml_diff>
--- a/GitHub - Talk .pptx
+++ b/GitHub - Talk .pptx
@@ -5340,6 +5340,120 @@
           </a:p>
           <a:p>
             <a:pPr algn="l"/>
+            <a:r>
+              <a:rPr lang="en-US" baseline="0" dirty="0" smtClean="0"/>
+              <a:t>Technologies invented &amp;&amp;|| popularized by NASA</a:t>
+            </a:r>
+            <a:endParaRPr lang="en-US" baseline="0" dirty="0" smtClean="0"/>
+          </a:p>
+          <a:p>
+            <a:pPr algn="l"/>
+            <a:r>
+              <a:rPr lang="en-US" dirty="0" smtClean="0"/>
+              <a:t>	- </a:t>
+            </a:r>
+            <a:r>
+              <a:rPr lang="en-US" dirty="0" err="1" smtClean="0"/>
+              <a:t>Solor</a:t>
+            </a:r>
+            <a:r>
+              <a:rPr lang="en-US" dirty="0" smtClean="0"/>
+              <a:t> panels</a:t>
+            </a:r>
+          </a:p>
+          <a:p>
+            <a:pPr algn="l"/>
+            <a:r>
+              <a:rPr lang="en-US" dirty="0" smtClean="0"/>
+              <a:t>	- </a:t>
+            </a:r>
+            <a:r>
+              <a:rPr lang="en-US" dirty="0" err="1" smtClean="0"/>
+              <a:t>Scrach</a:t>
+            </a:r>
+            <a:r>
+              <a:rPr lang="en-US" baseline="0" dirty="0" smtClean="0"/>
+              <a:t> resistant </a:t>
+            </a:r>
+            <a:r>
+              <a:rPr lang="en-US" baseline="0" dirty="0" err="1" smtClean="0"/>
+              <a:t>serfoses</a:t>
+            </a:r>
+            <a:endParaRPr lang="en-US" baseline="0" dirty="0" smtClean="0"/>
+          </a:p>
+          <a:p>
+            <a:pPr algn="l"/>
+            <a:r>
+              <a:rPr lang="en-US" baseline="0" dirty="0" smtClean="0"/>
+              <a:t>	 - Smoke detectors</a:t>
+            </a:r>
+          </a:p>
+          <a:p>
+            <a:pPr algn="l"/>
+            <a:r>
+              <a:rPr lang="en-US" baseline="0" dirty="0" smtClean="0"/>
+              <a:t>	- </a:t>
+            </a:r>
+            <a:r>
+              <a:rPr lang="en-US" baseline="0" dirty="0" err="1" smtClean="0"/>
+              <a:t>Bezprzewodowe</a:t>
+            </a:r>
+            <a:r>
+              <a:rPr lang="en-US" baseline="0" dirty="0" smtClean="0"/>
+              <a:t> </a:t>
+            </a:r>
+            <a:r>
+              <a:rPr lang="en-US" baseline="0" dirty="0" err="1" smtClean="0"/>
+              <a:t>narzedzia</a:t>
+            </a:r>
+            <a:r>
+              <a:rPr lang="en-US" baseline="0" dirty="0" smtClean="0"/>
+              <a:t> do </a:t>
+            </a:r>
+            <a:r>
+              <a:rPr lang="en-US" baseline="0" dirty="0" err="1" smtClean="0"/>
+              <a:t>pracy</a:t>
+            </a:r>
+            <a:endParaRPr lang="en-US" baseline="0" dirty="0" smtClean="0"/>
+          </a:p>
+          <a:p>
+            <a:pPr algn="l"/>
+            <a:r>
+              <a:rPr lang="en-US" baseline="0" dirty="0" smtClean="0"/>
+              <a:t>	- </a:t>
+            </a:r>
+            <a:r>
+              <a:rPr lang="en-US" baseline="0" dirty="0" err="1" smtClean="0"/>
+              <a:t>Filtry</a:t>
+            </a:r>
+            <a:r>
+              <a:rPr lang="en-US" baseline="0" dirty="0" smtClean="0"/>
+              <a:t> do </a:t>
+            </a:r>
+            <a:r>
+              <a:rPr lang="en-US" baseline="0" dirty="0" err="1" smtClean="0"/>
+              <a:t>wody</a:t>
+            </a:r>
+            <a:endParaRPr lang="en-US" baseline="0" dirty="0" smtClean="0"/>
+          </a:p>
+          <a:p>
+            <a:pPr algn="l"/>
+            <a:r>
+              <a:rPr lang="en-US" baseline="0" smtClean="0"/>
+              <a:t>	- High</a:t>
+            </a:r>
+            <a:r>
+              <a:rPr lang="en-US" baseline="0" dirty="0" smtClean="0"/>
+              <a:t>-</a:t>
+            </a:r>
+            <a:r>
+              <a:rPr lang="en-US" baseline="0" dirty="0" err="1" smtClean="0"/>
+              <a:t>insensity</a:t>
+            </a:r>
+            <a:r>
+              <a:rPr lang="en-US" baseline="0" dirty="0" smtClean="0"/>
+              <a:t> LED’s</a:t>
+            </a:r>
             <a:endParaRPr lang="en-US" dirty="0"/>
           </a:p>
         </p:txBody>
@@ -10520,13 +10634,9 @@
             </a:r>
             <a:r>
               <a:rPr lang="en-US" dirty="0" smtClean="0"/>
-              <a:t> book </a:t>
-            </a:r>
-            <a:r>
-              <a:rPr lang="en-US" smtClean="0"/>
-              <a:t>: Proof</a:t>
-            </a:r>
-            <a:endParaRPr lang="en-US"/>
+              <a:t> book : Proof</a:t>
+            </a:r>
+            <a:endParaRPr lang="en-US" dirty="0"/>
           </a:p>
         </p:txBody>
       </p:sp>

</xml_diff>